<commit_message>
Actualización calendario, sesion 3 corte - 2
</commit_message>
<xml_diff>
--- a/Sesion_2/Sesion_2.pptx
+++ b/Sesion_2/Sesion_2.pptx
@@ -419,28 +419,12 @@
           <pc:docMk/>
           <pc:sldMk cId="3709177429" sldId="274"/>
         </pc:sldMkLst>
-        <pc:spChg chg="del">
-          <ac:chgData name="JHEYSON FABIAN VILLAVISAN BUITRAGO" userId="e5ced5c2-d787-455d-b115-4f08a699b8c8" providerId="ADAL" clId="{3C960EF9-9F90-4C06-ADB8-88ED32B978A2}" dt="2025-02-04T15:24:50.095" v="6" actId="478"/>
-          <ac:spMkLst>
-            <pc:docMk/>
-            <pc:sldMk cId="3709177429" sldId="274"/>
-            <ac:spMk id="3" creationId="{4F1F9CC3-49B8-41A8-9878-3805D57595F8}"/>
-          </ac:spMkLst>
-        </pc:spChg>
         <pc:spChg chg="mod">
           <ac:chgData name="JHEYSON FABIAN VILLAVISAN BUITRAGO" userId="e5ced5c2-d787-455d-b115-4f08a699b8c8" providerId="ADAL" clId="{3C960EF9-9F90-4C06-ADB8-88ED32B978A2}" dt="2025-02-04T15:35:56.893" v="483" actId="404"/>
           <ac:spMkLst>
             <pc:docMk/>
             <pc:sldMk cId="3709177429" sldId="274"/>
             <ac:spMk id="4" creationId="{2C7E43D4-8286-4BEE-907B-3A35AE701C90}"/>
-          </ac:spMkLst>
-        </pc:spChg>
-        <pc:spChg chg="add del mod">
-          <ac:chgData name="JHEYSON FABIAN VILLAVISAN BUITRAGO" userId="e5ced5c2-d787-455d-b115-4f08a699b8c8" providerId="ADAL" clId="{3C960EF9-9F90-4C06-ADB8-88ED32B978A2}" dt="2025-02-04T15:24:51.965" v="7" actId="478"/>
-          <ac:spMkLst>
-            <pc:docMk/>
-            <pc:sldMk cId="3709177429" sldId="274"/>
-            <ac:spMk id="8" creationId="{E62122D8-BCFD-40AB-53B0-C29737D4FCFA}"/>
           </ac:spMkLst>
         </pc:spChg>
         <pc:spChg chg="mod">
@@ -451,14 +435,6 @@
             <ac:spMk id="10" creationId="{AF4E183E-A171-4923-A99E-D149888CEC37}"/>
           </ac:spMkLst>
         </pc:spChg>
-        <pc:picChg chg="del">
-          <ac:chgData name="JHEYSON FABIAN VILLAVISAN BUITRAGO" userId="e5ced5c2-d787-455d-b115-4f08a699b8c8" providerId="ADAL" clId="{3C960EF9-9F90-4C06-ADB8-88ED32B978A2}" dt="2025-02-04T15:24:53.321" v="8" actId="478"/>
-          <ac:picMkLst>
-            <pc:docMk/>
-            <pc:sldMk cId="3709177429" sldId="274"/>
-            <ac:picMk id="9" creationId="{2BCDCF25-80B5-4CA1-B1B6-1C7F924229A5}"/>
-          </ac:picMkLst>
-        </pc:picChg>
       </pc:sldChg>
       <pc:sldChg chg="del">
         <pc:chgData name="JHEYSON FABIAN VILLAVISAN BUITRAGO" userId="e5ced5c2-d787-455d-b115-4f08a699b8c8" providerId="ADAL" clId="{3C960EF9-9F90-4C06-ADB8-88ED32B978A2}" dt="2025-02-04T15:25:39.368" v="106" actId="47"/>
@@ -487,14 +463,6 @@
           <pc:docMk/>
           <pc:sldMk cId="2965408220" sldId="280"/>
         </pc:sldMkLst>
-        <pc:spChg chg="mod">
-          <ac:chgData name="JHEYSON FABIAN VILLAVISAN BUITRAGO" userId="e5ced5c2-d787-455d-b115-4f08a699b8c8" providerId="ADAL" clId="{3C960EF9-9F90-4C06-ADB8-88ED32B978A2}" dt="2025-02-04T15:24:27.738" v="4" actId="20577"/>
-          <ac:spMkLst>
-            <pc:docMk/>
-            <pc:sldMk cId="2965408220" sldId="280"/>
-            <ac:spMk id="11266" creationId="{74AD047A-E86C-4E92-874D-BAA043AB0B46}"/>
-          </ac:spMkLst>
-        </pc:spChg>
       </pc:sldChg>
       <pc:sldChg chg="delSp modSp add mod">
         <pc:chgData name="JHEYSON FABIAN VILLAVISAN BUITRAGO" userId="e5ced5c2-d787-455d-b115-4f08a699b8c8" providerId="ADAL" clId="{3C960EF9-9F90-4C06-ADB8-88ED32B978A2}" dt="2025-02-04T15:38:32.251" v="580" actId="20577"/>
@@ -502,38 +470,6 @@
           <pc:docMk/>
           <pc:sldMk cId="2753606348" sldId="281"/>
         </pc:sldMkLst>
-        <pc:spChg chg="mod">
-          <ac:chgData name="JHEYSON FABIAN VILLAVISAN BUITRAGO" userId="e5ced5c2-d787-455d-b115-4f08a699b8c8" providerId="ADAL" clId="{3C960EF9-9F90-4C06-ADB8-88ED32B978A2}" dt="2025-02-04T15:36:41.854" v="511" actId="1076"/>
-          <ac:spMkLst>
-            <pc:docMk/>
-            <pc:sldMk cId="2753606348" sldId="281"/>
-            <ac:spMk id="2" creationId="{298A856A-91BC-6DDA-05A3-FEFA0B4AA61D}"/>
-          </ac:spMkLst>
-        </pc:spChg>
-        <pc:spChg chg="mod">
-          <ac:chgData name="JHEYSON FABIAN VILLAVISAN BUITRAGO" userId="e5ced5c2-d787-455d-b115-4f08a699b8c8" providerId="ADAL" clId="{3C960EF9-9F90-4C06-ADB8-88ED32B978A2}" dt="2025-02-04T15:38:32.251" v="580" actId="20577"/>
-          <ac:spMkLst>
-            <pc:docMk/>
-            <pc:sldMk cId="2753606348" sldId="281"/>
-            <ac:spMk id="4" creationId="{2A873A57-77DC-4C43-3689-0B82FB1544DB}"/>
-          </ac:spMkLst>
-        </pc:spChg>
-        <pc:spChg chg="mod">
-          <ac:chgData name="JHEYSON FABIAN VILLAVISAN BUITRAGO" userId="e5ced5c2-d787-455d-b115-4f08a699b8c8" providerId="ADAL" clId="{3C960EF9-9F90-4C06-ADB8-88ED32B978A2}" dt="2025-02-04T15:29:54.047" v="370" actId="20577"/>
-          <ac:spMkLst>
-            <pc:docMk/>
-            <pc:sldMk cId="2753606348" sldId="281"/>
-            <ac:spMk id="10" creationId="{F33C249C-1126-8114-6B8D-5DA810FF3103}"/>
-          </ac:spMkLst>
-        </pc:spChg>
-        <pc:picChg chg="del">
-          <ac:chgData name="JHEYSON FABIAN VILLAVISAN BUITRAGO" userId="e5ced5c2-d787-455d-b115-4f08a699b8c8" providerId="ADAL" clId="{3C960EF9-9F90-4C06-ADB8-88ED32B978A2}" dt="2025-02-04T15:26:34.048" v="133" actId="478"/>
-          <ac:picMkLst>
-            <pc:docMk/>
-            <pc:sldMk cId="2753606348" sldId="281"/>
-            <ac:picMk id="6" creationId="{BF3C281F-9B6B-B7F5-5F5E-E08BFF55851C}"/>
-          </ac:picMkLst>
-        </pc:picChg>
       </pc:sldChg>
       <pc:sldChg chg="addSp modSp add mod">
         <pc:chgData name="JHEYSON FABIAN VILLAVISAN BUITRAGO" userId="e5ced5c2-d787-455d-b115-4f08a699b8c8" providerId="ADAL" clId="{3C960EF9-9F90-4C06-ADB8-88ED32B978A2}" dt="2025-02-04T15:56:44.871" v="944" actId="113"/>
@@ -541,38 +477,6 @@
           <pc:docMk/>
           <pc:sldMk cId="949277400" sldId="282"/>
         </pc:sldMkLst>
-        <pc:spChg chg="mod">
-          <ac:chgData name="JHEYSON FABIAN VILLAVISAN BUITRAGO" userId="e5ced5c2-d787-455d-b115-4f08a699b8c8" providerId="ADAL" clId="{3C960EF9-9F90-4C06-ADB8-88ED32B978A2}" dt="2025-02-04T15:35:40.793" v="465" actId="403"/>
-          <ac:spMkLst>
-            <pc:docMk/>
-            <pc:sldMk cId="949277400" sldId="282"/>
-            <ac:spMk id="2" creationId="{31B6C9C9-5F4F-8A13-1C47-DE5B94DB6257}"/>
-          </ac:spMkLst>
-        </pc:spChg>
-        <pc:spChg chg="add mod">
-          <ac:chgData name="JHEYSON FABIAN VILLAVISAN BUITRAGO" userId="e5ced5c2-d787-455d-b115-4f08a699b8c8" providerId="ADAL" clId="{3C960EF9-9F90-4C06-ADB8-88ED32B978A2}" dt="2025-02-04T15:33:07.712" v="437" actId="14100"/>
-          <ac:spMkLst>
-            <pc:docMk/>
-            <pc:sldMk cId="949277400" sldId="282"/>
-            <ac:spMk id="3" creationId="{524C7DBD-24A8-9003-67F1-11A328722545}"/>
-          </ac:spMkLst>
-        </pc:spChg>
-        <pc:spChg chg="mod">
-          <ac:chgData name="JHEYSON FABIAN VILLAVISAN BUITRAGO" userId="e5ced5c2-d787-455d-b115-4f08a699b8c8" providerId="ADAL" clId="{3C960EF9-9F90-4C06-ADB8-88ED32B978A2}" dt="2025-02-04T15:56:44.871" v="944" actId="113"/>
-          <ac:spMkLst>
-            <pc:docMk/>
-            <pc:sldMk cId="949277400" sldId="282"/>
-            <ac:spMk id="4" creationId="{020446E1-D9C0-13D9-71E8-78C4891BA132}"/>
-          </ac:spMkLst>
-        </pc:spChg>
-        <pc:spChg chg="mod">
-          <ac:chgData name="JHEYSON FABIAN VILLAVISAN BUITRAGO" userId="e5ced5c2-d787-455d-b115-4f08a699b8c8" providerId="ADAL" clId="{3C960EF9-9F90-4C06-ADB8-88ED32B978A2}" dt="2025-02-04T15:33:11.235" v="438" actId="20577"/>
-          <ac:spMkLst>
-            <pc:docMk/>
-            <pc:sldMk cId="949277400" sldId="282"/>
-            <ac:spMk id="10" creationId="{7CB40483-09DA-53B9-39D6-7D8E756ED1E8}"/>
-          </ac:spMkLst>
-        </pc:spChg>
       </pc:sldChg>
       <pc:sldChg chg="modSp add mod">
         <pc:chgData name="JHEYSON FABIAN VILLAVISAN BUITRAGO" userId="e5ced5c2-d787-455d-b115-4f08a699b8c8" providerId="ADAL" clId="{3C960EF9-9F90-4C06-ADB8-88ED32B978A2}" dt="2025-02-04T15:56:31.468" v="943" actId="113"/>
@@ -580,30 +484,6 @@
           <pc:docMk/>
           <pc:sldMk cId="989802654" sldId="283"/>
         </pc:sldMkLst>
-        <pc:spChg chg="mod">
-          <ac:chgData name="JHEYSON FABIAN VILLAVISAN BUITRAGO" userId="e5ced5c2-d787-455d-b115-4f08a699b8c8" providerId="ADAL" clId="{3C960EF9-9F90-4C06-ADB8-88ED32B978A2}" dt="2025-02-04T15:39:00.413" v="592" actId="113"/>
-          <ac:spMkLst>
-            <pc:docMk/>
-            <pc:sldMk cId="989802654" sldId="283"/>
-            <ac:spMk id="2" creationId="{FE946512-6F4B-4C6E-F0FB-83C122EA00D6}"/>
-          </ac:spMkLst>
-        </pc:spChg>
-        <pc:spChg chg="mod">
-          <ac:chgData name="JHEYSON FABIAN VILLAVISAN BUITRAGO" userId="e5ced5c2-d787-455d-b115-4f08a699b8c8" providerId="ADAL" clId="{3C960EF9-9F90-4C06-ADB8-88ED32B978A2}" dt="2025-02-04T15:56:31.468" v="943" actId="113"/>
-          <ac:spMkLst>
-            <pc:docMk/>
-            <pc:sldMk cId="989802654" sldId="283"/>
-            <ac:spMk id="4" creationId="{31E26430-40C9-2A7B-414F-472BB4A923F2}"/>
-          </ac:spMkLst>
-        </pc:spChg>
-        <pc:spChg chg="mod">
-          <ac:chgData name="JHEYSON FABIAN VILLAVISAN BUITRAGO" userId="e5ced5c2-d787-455d-b115-4f08a699b8c8" providerId="ADAL" clId="{3C960EF9-9F90-4C06-ADB8-88ED32B978A2}" dt="2025-02-04T15:33:41.313" v="440" actId="20577"/>
-          <ac:spMkLst>
-            <pc:docMk/>
-            <pc:sldMk cId="989802654" sldId="283"/>
-            <ac:spMk id="10" creationId="{D6B6DB48-361E-538C-B91B-45312A4FB43C}"/>
-          </ac:spMkLst>
-        </pc:spChg>
       </pc:sldChg>
       <pc:sldChg chg="modSp add mod">
         <pc:chgData name="JHEYSON FABIAN VILLAVISAN BUITRAGO" userId="e5ced5c2-d787-455d-b115-4f08a699b8c8" providerId="ADAL" clId="{3C960EF9-9F90-4C06-ADB8-88ED32B978A2}" dt="2025-02-04T15:39:23.528" v="601" actId="20577"/>
@@ -611,30 +491,6 @@
           <pc:docMk/>
           <pc:sldMk cId="221020506" sldId="284"/>
         </pc:sldMkLst>
-        <pc:spChg chg="mod">
-          <ac:chgData name="JHEYSON FABIAN VILLAVISAN BUITRAGO" userId="e5ced5c2-d787-455d-b115-4f08a699b8c8" providerId="ADAL" clId="{3C960EF9-9F90-4C06-ADB8-88ED32B978A2}" dt="2025-02-04T15:39:11.244" v="596" actId="14100"/>
-          <ac:spMkLst>
-            <pc:docMk/>
-            <pc:sldMk cId="221020506" sldId="284"/>
-            <ac:spMk id="2" creationId="{3A84CDFE-589A-7254-A188-F62FA5520D76}"/>
-          </ac:spMkLst>
-        </pc:spChg>
-        <pc:spChg chg="mod">
-          <ac:chgData name="JHEYSON FABIAN VILLAVISAN BUITRAGO" userId="e5ced5c2-d787-455d-b115-4f08a699b8c8" providerId="ADAL" clId="{3C960EF9-9F90-4C06-ADB8-88ED32B978A2}" dt="2025-02-04T15:39:17.988" v="600" actId="27636"/>
-          <ac:spMkLst>
-            <pc:docMk/>
-            <pc:sldMk cId="221020506" sldId="284"/>
-            <ac:spMk id="4" creationId="{EA5ED10F-C7C5-1A14-7C7E-6D3FAAC02831}"/>
-          </ac:spMkLst>
-        </pc:spChg>
-        <pc:spChg chg="mod">
-          <ac:chgData name="JHEYSON FABIAN VILLAVISAN BUITRAGO" userId="e5ced5c2-d787-455d-b115-4f08a699b8c8" providerId="ADAL" clId="{3C960EF9-9F90-4C06-ADB8-88ED32B978A2}" dt="2025-02-04T15:39:23.528" v="601" actId="20577"/>
-          <ac:spMkLst>
-            <pc:docMk/>
-            <pc:sldMk cId="221020506" sldId="284"/>
-            <ac:spMk id="10" creationId="{EB915BF0-AFF0-26CB-3D3F-4FE148DE17A0}"/>
-          </ac:spMkLst>
-        </pc:spChg>
       </pc:sldChg>
       <pc:sldChg chg="addSp delSp modSp add mod">
         <pc:chgData name="JHEYSON FABIAN VILLAVISAN BUITRAGO" userId="e5ced5c2-d787-455d-b115-4f08a699b8c8" providerId="ADAL" clId="{3C960EF9-9F90-4C06-ADB8-88ED32B978A2}" dt="2025-02-04T15:59:24.826" v="1061" actId="113"/>
@@ -642,53 +498,13 @@
           <pc:docMk/>
           <pc:sldMk cId="943304343" sldId="285"/>
         </pc:sldMkLst>
-        <pc:spChg chg="mod">
-          <ac:chgData name="JHEYSON FABIAN VILLAVISAN BUITRAGO" userId="e5ced5c2-d787-455d-b115-4f08a699b8c8" providerId="ADAL" clId="{3C960EF9-9F90-4C06-ADB8-88ED32B978A2}" dt="2025-02-04T15:45:07.627" v="637" actId="20577"/>
-          <ac:spMkLst>
-            <pc:docMk/>
-            <pc:sldMk cId="943304343" sldId="285"/>
-            <ac:spMk id="2" creationId="{05270885-CB56-64D1-B67D-42F22CDA5CA8}"/>
-          </ac:spMkLst>
-        </pc:spChg>
-        <pc:spChg chg="del">
-          <ac:chgData name="JHEYSON FABIAN VILLAVISAN BUITRAGO" userId="e5ced5c2-d787-455d-b115-4f08a699b8c8" providerId="ADAL" clId="{3C960EF9-9F90-4C06-ADB8-88ED32B978A2}" dt="2025-02-04T15:55:29.460" v="941" actId="478"/>
-          <ac:spMkLst>
-            <pc:docMk/>
-            <pc:sldMk cId="943304343" sldId="285"/>
-            <ac:spMk id="3" creationId="{2C8826FF-9C7E-D9DA-8149-C1FE1495A616}"/>
-          </ac:spMkLst>
-        </pc:spChg>
-        <pc:spChg chg="add del mod">
-          <ac:chgData name="JHEYSON FABIAN VILLAVISAN BUITRAGO" userId="e5ced5c2-d787-455d-b115-4f08a699b8c8" providerId="ADAL" clId="{3C960EF9-9F90-4C06-ADB8-88ED32B978A2}" dt="2025-02-04T15:59:24.826" v="1061" actId="113"/>
-          <ac:spMkLst>
-            <pc:docMk/>
-            <pc:sldMk cId="943304343" sldId="285"/>
-            <ac:spMk id="4" creationId="{94AC859E-EEF1-6F2B-0BC9-1EB7422DE145}"/>
-          </ac:spMkLst>
-        </pc:spChg>
-        <pc:spChg chg="add mod">
-          <ac:chgData name="JHEYSON FABIAN VILLAVISAN BUITRAGO" userId="e5ced5c2-d787-455d-b115-4f08a699b8c8" providerId="ADAL" clId="{3C960EF9-9F90-4C06-ADB8-88ED32B978A2}" dt="2025-02-04T15:46:04.708" v="643"/>
-          <ac:spMkLst>
-            <pc:docMk/>
-            <pc:sldMk cId="943304343" sldId="285"/>
-            <ac:spMk id="6" creationId="{7E2E0811-C2F0-CC38-6B0A-34D6B851834F}"/>
-          </ac:spMkLst>
-        </pc:spChg>
-        <pc:spChg chg="mod">
-          <ac:chgData name="JHEYSON FABIAN VILLAVISAN BUITRAGO" userId="e5ced5c2-d787-455d-b115-4f08a699b8c8" providerId="ADAL" clId="{3C960EF9-9F90-4C06-ADB8-88ED32B978A2}" dt="2025-02-04T15:44:52.069" v="603" actId="20577"/>
-          <ac:spMkLst>
-            <pc:docMk/>
-            <pc:sldMk cId="943304343" sldId="285"/>
-            <ac:spMk id="10" creationId="{91BEDDE4-617B-DBBD-F5CA-0C6BCFC90736}"/>
-          </ac:spMkLst>
-        </pc:spChg>
       </pc:sldChg>
     </pc:docChg>
   </pc:docChgLst>
   <pc:docChgLst>
     <pc:chgData name="JHEYSON FABIAN VILLAVISAN BUITRAGO" userId="e5ced5c2-d787-455d-b115-4f08a699b8c8" providerId="ADAL" clId="{8E0334EF-AE22-44E3-B339-74E453B32869}"/>
     <pc:docChg chg="undo custSel addSld delSld modSld modSection">
-      <pc:chgData name="JHEYSON FABIAN VILLAVISAN BUITRAGO" userId="e5ced5c2-d787-455d-b115-4f08a699b8c8" providerId="ADAL" clId="{8E0334EF-AE22-44E3-B339-74E453B32869}" dt="2025-02-05T20:17:08.880" v="1536" actId="20577"/>
+      <pc:chgData name="JHEYSON FABIAN VILLAVISAN BUITRAGO" userId="e5ced5c2-d787-455d-b115-4f08a699b8c8" providerId="ADAL" clId="{8E0334EF-AE22-44E3-B339-74E453B32869}" dt="2025-02-06T12:38:38.659" v="1548" actId="20577"/>
       <pc:docMkLst>
         <pc:docMk/>
       </pc:docMkLst>
@@ -817,7 +633,7 @@
         </pc:picChg>
       </pc:sldChg>
       <pc:sldChg chg="addSp modSp add mod">
-        <pc:chgData name="JHEYSON FABIAN VILLAVISAN BUITRAGO" userId="e5ced5c2-d787-455d-b115-4f08a699b8c8" providerId="ADAL" clId="{8E0334EF-AE22-44E3-B339-74E453B32869}" dt="2025-02-05T20:17:08.880" v="1536" actId="20577"/>
+        <pc:chgData name="JHEYSON FABIAN VILLAVISAN BUITRAGO" userId="e5ced5c2-d787-455d-b115-4f08a699b8c8" providerId="ADAL" clId="{8E0334EF-AE22-44E3-B339-74E453B32869}" dt="2025-02-06T12:38:38.659" v="1548" actId="20577"/>
         <pc:sldMkLst>
           <pc:docMk/>
           <pc:sldMk cId="2953627009" sldId="290"/>
@@ -839,7 +655,7 @@
           </ac:spMkLst>
         </pc:spChg>
         <pc:spChg chg="mod">
-          <ac:chgData name="JHEYSON FABIAN VILLAVISAN BUITRAGO" userId="e5ced5c2-d787-455d-b115-4f08a699b8c8" providerId="ADAL" clId="{8E0334EF-AE22-44E3-B339-74E453B32869}" dt="2025-02-05T20:17:08.880" v="1536" actId="20577"/>
+          <ac:chgData name="JHEYSON FABIAN VILLAVISAN BUITRAGO" userId="e5ced5c2-d787-455d-b115-4f08a699b8c8" providerId="ADAL" clId="{8E0334EF-AE22-44E3-B339-74E453B32869}" dt="2025-02-06T12:38:38.659" v="1548" actId="20577"/>
           <ac:spMkLst>
             <pc:docMk/>
             <pc:sldMk cId="2953627009" sldId="290"/>
@@ -1045,22 +861,6 @@
           <pc:docMk/>
           <pc:sldMk cId="0" sldId="261"/>
         </pc:sldMkLst>
-        <pc:spChg chg="mod">
-          <ac:chgData name="JHEYSON FABIAN VILLAVISAN BUITRAGO" userId="e5ced5c2-d787-455d-b115-4f08a699b8c8" providerId="ADAL" clId="{29AE3C56-95F7-4B8B-A3E1-184D660B9D00}" dt="2025-02-04T13:40:15.051" v="22"/>
-          <ac:spMkLst>
-            <pc:docMk/>
-            <pc:sldMk cId="0" sldId="261"/>
-            <ac:spMk id="2" creationId="{B7BBAA63-6E9C-7FD5-350A-58CDC54BCE93}"/>
-          </ac:spMkLst>
-        </pc:spChg>
-        <pc:graphicFrameChg chg="mod">
-          <ac:chgData name="JHEYSON FABIAN VILLAVISAN BUITRAGO" userId="e5ced5c2-d787-455d-b115-4f08a699b8c8" providerId="ADAL" clId="{29AE3C56-95F7-4B8B-A3E1-184D660B9D00}" dt="2025-02-04T14:19:45.992" v="825" actId="20577"/>
-          <ac:graphicFrameMkLst>
-            <pc:docMk/>
-            <pc:sldMk cId="0" sldId="261"/>
-            <ac:graphicFrameMk id="7" creationId="{3B28400A-9287-40BA-9001-2E821D706B4D}"/>
-          </ac:graphicFrameMkLst>
-        </pc:graphicFrameChg>
       </pc:sldChg>
       <pc:sldChg chg="modSp add mod">
         <pc:chgData name="JHEYSON FABIAN VILLAVISAN BUITRAGO" userId="e5ced5c2-d787-455d-b115-4f08a699b8c8" providerId="ADAL" clId="{29AE3C56-95F7-4B8B-A3E1-184D660B9D00}" dt="2025-02-04T14:31:11.579" v="1004" actId="20577"/>
@@ -1068,22 +868,6 @@
           <pc:docMk/>
           <pc:sldMk cId="0" sldId="266"/>
         </pc:sldMkLst>
-        <pc:spChg chg="mod">
-          <ac:chgData name="JHEYSON FABIAN VILLAVISAN BUITRAGO" userId="e5ced5c2-d787-455d-b115-4f08a699b8c8" providerId="ADAL" clId="{29AE3C56-95F7-4B8B-A3E1-184D660B9D00}" dt="2025-02-04T14:31:11.579" v="1004" actId="20577"/>
-          <ac:spMkLst>
-            <pc:docMk/>
-            <pc:sldMk cId="0" sldId="266"/>
-            <ac:spMk id="9" creationId="{1DF9086F-7804-4245-BF66-46E11D73F05F}"/>
-          </ac:spMkLst>
-        </pc:spChg>
-        <pc:spChg chg="mod">
-          <ac:chgData name="JHEYSON FABIAN VILLAVISAN BUITRAGO" userId="e5ced5c2-d787-455d-b115-4f08a699b8c8" providerId="ADAL" clId="{29AE3C56-95F7-4B8B-A3E1-184D660B9D00}" dt="2025-02-04T14:27:34.141" v="996" actId="20577"/>
-          <ac:spMkLst>
-            <pc:docMk/>
-            <pc:sldMk cId="0" sldId="266"/>
-            <ac:spMk id="17410" creationId="{B3EF008C-EFA0-44F3-951B-EB1557F44ACC}"/>
-          </ac:spMkLst>
-        </pc:spChg>
       </pc:sldChg>
       <pc:sldChg chg="modSp mod">
         <pc:chgData name="JHEYSON FABIAN VILLAVISAN BUITRAGO" userId="e5ced5c2-d787-455d-b115-4f08a699b8c8" providerId="ADAL" clId="{29AE3C56-95F7-4B8B-A3E1-184D660B9D00}" dt="2025-02-04T14:27:42.659" v="1000" actId="20577"/>
@@ -1091,30 +875,6 @@
           <pc:docMk/>
           <pc:sldMk cId="0" sldId="268"/>
         </pc:sldMkLst>
-        <pc:spChg chg="mod">
-          <ac:chgData name="JHEYSON FABIAN VILLAVISAN BUITRAGO" userId="e5ced5c2-d787-455d-b115-4f08a699b8c8" providerId="ADAL" clId="{29AE3C56-95F7-4B8B-A3E1-184D660B9D00}" dt="2025-02-04T13:40:19.948" v="24"/>
-          <ac:spMkLst>
-            <pc:docMk/>
-            <pc:sldMk cId="0" sldId="268"/>
-            <ac:spMk id="2" creationId="{E3039CD5-5EDF-B67E-43E0-6A692B67FA09}"/>
-          </ac:spMkLst>
-        </pc:spChg>
-        <pc:spChg chg="mod">
-          <ac:chgData name="JHEYSON FABIAN VILLAVISAN BUITRAGO" userId="e5ced5c2-d787-455d-b115-4f08a699b8c8" providerId="ADAL" clId="{29AE3C56-95F7-4B8B-A3E1-184D660B9D00}" dt="2025-02-04T13:40:32.453" v="26" actId="20577"/>
-          <ac:spMkLst>
-            <pc:docMk/>
-            <pc:sldMk cId="0" sldId="268"/>
-            <ac:spMk id="3" creationId="{008BB48C-FC05-3615-A776-2D1677A4E9F1}"/>
-          </ac:spMkLst>
-        </pc:spChg>
-        <pc:spChg chg="mod">
-          <ac:chgData name="JHEYSON FABIAN VILLAVISAN BUITRAGO" userId="e5ced5c2-d787-455d-b115-4f08a699b8c8" providerId="ADAL" clId="{29AE3C56-95F7-4B8B-A3E1-184D660B9D00}" dt="2025-02-04T14:27:42.659" v="1000" actId="20577"/>
-          <ac:spMkLst>
-            <pc:docMk/>
-            <pc:sldMk cId="0" sldId="268"/>
-            <ac:spMk id="23554" creationId="{EA98F516-CD1D-4B94-8AAC-2D9EAEE9939C}"/>
-          </ac:spMkLst>
-        </pc:spChg>
       </pc:sldChg>
       <pc:sldChg chg="modSp mod">
         <pc:chgData name="JHEYSON FABIAN VILLAVISAN BUITRAGO" userId="e5ced5c2-d787-455d-b115-4f08a699b8c8" providerId="ADAL" clId="{29AE3C56-95F7-4B8B-A3E1-184D660B9D00}" dt="2025-02-04T13:39:58.014" v="19"/>
@@ -1137,22 +897,6 @@
           <pc:docMk/>
           <pc:sldMk cId="2680639377" sldId="275"/>
         </pc:sldMkLst>
-        <pc:spChg chg="mod">
-          <ac:chgData name="JHEYSON FABIAN VILLAVISAN BUITRAGO" userId="e5ced5c2-d787-455d-b115-4f08a699b8c8" providerId="ADAL" clId="{29AE3C56-95F7-4B8B-A3E1-184D660B9D00}" dt="2025-02-04T14:31:09.215" v="1003" actId="20577"/>
-          <ac:spMkLst>
-            <pc:docMk/>
-            <pc:sldMk cId="2680639377" sldId="275"/>
-            <ac:spMk id="9" creationId="{1DF9086F-7804-4245-BF66-46E11D73F05F}"/>
-          </ac:spMkLst>
-        </pc:spChg>
-        <pc:spChg chg="mod">
-          <ac:chgData name="JHEYSON FABIAN VILLAVISAN BUITRAGO" userId="e5ced5c2-d787-455d-b115-4f08a699b8c8" providerId="ADAL" clId="{29AE3C56-95F7-4B8B-A3E1-184D660B9D00}" dt="2025-02-04T14:27:37.416" v="998" actId="20577"/>
-          <ac:spMkLst>
-            <pc:docMk/>
-            <pc:sldMk cId="2680639377" sldId="275"/>
-            <ac:spMk id="17410" creationId="{B3EF008C-EFA0-44F3-951B-EB1557F44ACC}"/>
-          </ac:spMkLst>
-        </pc:spChg>
       </pc:sldChg>
       <pc:sldChg chg="delSp modSp mod">
         <pc:chgData name="JHEYSON FABIAN VILLAVISAN BUITRAGO" userId="e5ced5c2-d787-455d-b115-4f08a699b8c8" providerId="ADAL" clId="{29AE3C56-95F7-4B8B-A3E1-184D660B9D00}" dt="2025-02-04T14:27:40.001" v="999" actId="20577"/>
@@ -1160,30 +904,6 @@
           <pc:docMk/>
           <pc:sldMk cId="1955606898" sldId="277"/>
         </pc:sldMkLst>
-        <pc:spChg chg="mod">
-          <ac:chgData name="JHEYSON FABIAN VILLAVISAN BUITRAGO" userId="e5ced5c2-d787-455d-b115-4f08a699b8c8" providerId="ADAL" clId="{29AE3C56-95F7-4B8B-A3E1-184D660B9D00}" dt="2025-02-04T13:40:17.825" v="23"/>
-          <ac:spMkLst>
-            <pc:docMk/>
-            <pc:sldMk cId="1955606898" sldId="277"/>
-            <ac:spMk id="2" creationId="{F5B918F2-F494-3DBB-D058-68F2779A0025}"/>
-          </ac:spMkLst>
-        </pc:spChg>
-        <pc:spChg chg="del mod">
-          <ac:chgData name="JHEYSON FABIAN VILLAVISAN BUITRAGO" userId="e5ced5c2-d787-455d-b115-4f08a699b8c8" providerId="ADAL" clId="{29AE3C56-95F7-4B8B-A3E1-184D660B9D00}" dt="2025-02-04T14:23:13.546" v="827" actId="478"/>
-          <ac:spMkLst>
-            <pc:docMk/>
-            <pc:sldMk cId="1955606898" sldId="277"/>
-            <ac:spMk id="12" creationId="{B4336C17-6123-3859-97BF-FC6F99A43B32}"/>
-          </ac:spMkLst>
-        </pc:spChg>
-        <pc:spChg chg="mod">
-          <ac:chgData name="JHEYSON FABIAN VILLAVISAN BUITRAGO" userId="e5ced5c2-d787-455d-b115-4f08a699b8c8" providerId="ADAL" clId="{29AE3C56-95F7-4B8B-A3E1-184D660B9D00}" dt="2025-02-04T14:27:40.001" v="999" actId="20577"/>
-          <ac:spMkLst>
-            <pc:docMk/>
-            <pc:sldMk cId="1955606898" sldId="277"/>
-            <ac:spMk id="21506" creationId="{974AAA16-E8D7-47E1-ABBC-3CB9C4D3BD82}"/>
-          </ac:spMkLst>
-        </pc:spChg>
       </pc:sldChg>
       <pc:sldChg chg="modSp mod">
         <pc:chgData name="JHEYSON FABIAN VILLAVISAN BUITRAGO" userId="e5ced5c2-d787-455d-b115-4f08a699b8c8" providerId="ADAL" clId="{29AE3C56-95F7-4B8B-A3E1-184D660B9D00}" dt="2025-02-04T13:40:01.726" v="20"/>
@@ -1191,14 +911,6 @@
           <pc:docMk/>
           <pc:sldMk cId="214171354" sldId="278"/>
         </pc:sldMkLst>
-        <pc:spChg chg="mod">
-          <ac:chgData name="JHEYSON FABIAN VILLAVISAN BUITRAGO" userId="e5ced5c2-d787-455d-b115-4f08a699b8c8" providerId="ADAL" clId="{29AE3C56-95F7-4B8B-A3E1-184D660B9D00}" dt="2025-02-04T13:40:01.726" v="20"/>
-          <ac:spMkLst>
-            <pc:docMk/>
-            <pc:sldMk cId="214171354" sldId="278"/>
-            <ac:spMk id="5" creationId="{DA8BB1D7-DBA8-5CD6-CAAC-0581D75A6D40}"/>
-          </ac:spMkLst>
-        </pc:spChg>
       </pc:sldChg>
       <pc:sldChg chg="addSp modSp mod">
         <pc:chgData name="JHEYSON FABIAN VILLAVISAN BUITRAGO" userId="e5ced5c2-d787-455d-b115-4f08a699b8c8" providerId="ADAL" clId="{29AE3C56-95F7-4B8B-A3E1-184D660B9D00}" dt="2025-02-04T14:46:47.942" v="1030" actId="20577"/>
@@ -1206,38 +918,6 @@
           <pc:docMk/>
           <pc:sldMk cId="2965408220" sldId="280"/>
         </pc:sldMkLst>
-        <pc:spChg chg="add mod">
-          <ac:chgData name="JHEYSON FABIAN VILLAVISAN BUITRAGO" userId="e5ced5c2-d787-455d-b115-4f08a699b8c8" providerId="ADAL" clId="{29AE3C56-95F7-4B8B-A3E1-184D660B9D00}" dt="2025-02-04T14:26:43.825" v="991" actId="13926"/>
-          <ac:spMkLst>
-            <pc:docMk/>
-            <pc:sldMk cId="2965408220" sldId="280"/>
-            <ac:spMk id="2" creationId="{DC12FCB8-0305-E041-1893-DDFE85DEBAFF}"/>
-          </ac:spMkLst>
-        </pc:spChg>
-        <pc:spChg chg="mod">
-          <ac:chgData name="JHEYSON FABIAN VILLAVISAN BUITRAGO" userId="e5ced5c2-d787-455d-b115-4f08a699b8c8" providerId="ADAL" clId="{29AE3C56-95F7-4B8B-A3E1-184D660B9D00}" dt="2025-02-04T14:24:20.908" v="852" actId="20577"/>
-          <ac:spMkLst>
-            <pc:docMk/>
-            <pc:sldMk cId="2965408220" sldId="280"/>
-            <ac:spMk id="8" creationId="{5932E3F1-24A7-A01F-0773-6237BD556E80}"/>
-          </ac:spMkLst>
-        </pc:spChg>
-        <pc:spChg chg="mod">
-          <ac:chgData name="JHEYSON FABIAN VILLAVISAN BUITRAGO" userId="e5ced5c2-d787-455d-b115-4f08a699b8c8" providerId="ADAL" clId="{29AE3C56-95F7-4B8B-A3E1-184D660B9D00}" dt="2025-02-04T13:40:04.920" v="21"/>
-          <ac:spMkLst>
-            <pc:docMk/>
-            <pc:sldMk cId="2965408220" sldId="280"/>
-            <ac:spMk id="9" creationId="{79EF761A-FEAD-D9F3-BD56-49599C4CE1E2}"/>
-          </ac:spMkLst>
-        </pc:spChg>
-        <pc:graphicFrameChg chg="mod modGraphic">
-          <ac:chgData name="JHEYSON FABIAN VILLAVISAN BUITRAGO" userId="e5ced5c2-d787-455d-b115-4f08a699b8c8" providerId="ADAL" clId="{29AE3C56-95F7-4B8B-A3E1-184D660B9D00}" dt="2025-02-04T14:46:47.942" v="1030" actId="20577"/>
-          <ac:graphicFrameMkLst>
-            <pc:docMk/>
-            <pc:sldMk cId="2965408220" sldId="280"/>
-            <ac:graphicFrameMk id="6" creationId="{D45444DB-DE93-829B-F32A-C3FB962F868B}"/>
-          </ac:graphicFrameMkLst>
-        </pc:graphicFrameChg>
       </pc:sldChg>
     </pc:docChg>
   </pc:docChgLst>
@@ -1542,7 +1222,7 @@
               <a:pPr>
                 <a:defRPr/>
               </a:pPr>
-              <a:t>5/02/2025</a:t>
+              <a:t>6/02/2025</a:t>
             </a:fld>
             <a:endParaRPr lang="es-CO"/>
           </a:p>
@@ -1785,7 +1465,7 @@
               <a:pPr>
                 <a:defRPr/>
               </a:pPr>
-              <a:t>5/02/2025</a:t>
+              <a:t>6/02/2025</a:t>
             </a:fld>
             <a:endParaRPr lang="es-CO"/>
           </a:p>
@@ -2861,7 +2541,7 @@
           <a:p>
             <a:fld id="{9CF7635E-2D71-42E7-9E6C-FBB85A15A85F}" type="datetimeFigureOut">
               <a:rPr lang="es-CO" smtClean="0"/>
-              <a:t>5/02/2025</a:t>
+              <a:t>6/02/2025</a:t>
             </a:fld>
             <a:endParaRPr lang="es-CO"/>
           </a:p>
@@ -3127,7 +2807,7 @@
           <a:p>
             <a:fld id="{9CF7635E-2D71-42E7-9E6C-FBB85A15A85F}" type="datetimeFigureOut">
               <a:rPr lang="es-CO" smtClean="0"/>
-              <a:t>5/02/2025</a:t>
+              <a:t>6/02/2025</a:t>
             </a:fld>
             <a:endParaRPr lang="es-CO"/>
           </a:p>
@@ -3343,7 +3023,7 @@
           <a:p>
             <a:fld id="{9CF7635E-2D71-42E7-9E6C-FBB85A15A85F}" type="datetimeFigureOut">
               <a:rPr lang="es-CO" smtClean="0"/>
-              <a:t>5/02/2025</a:t>
+              <a:t>6/02/2025</a:t>
             </a:fld>
             <a:endParaRPr lang="es-CO"/>
           </a:p>
@@ -4972,7 +4652,7 @@
           <a:p>
             <a:fld id="{9CF7635E-2D71-42E7-9E6C-FBB85A15A85F}" type="datetimeFigureOut">
               <a:rPr lang="es-CO" smtClean="0"/>
-              <a:t>5/02/2025</a:t>
+              <a:t>6/02/2025</a:t>
             </a:fld>
             <a:endParaRPr lang="es-CO"/>
           </a:p>
@@ -5419,7 +5099,7 @@
           <a:p>
             <a:fld id="{9CF7635E-2D71-42E7-9E6C-FBB85A15A85F}" type="datetimeFigureOut">
               <a:rPr lang="es-CO" smtClean="0"/>
-              <a:t>5/02/2025</a:t>
+              <a:t>6/02/2025</a:t>
             </a:fld>
             <a:endParaRPr lang="es-CO"/>
           </a:p>
@@ -5693,7 +5373,7 @@
           <a:p>
             <a:fld id="{9CF7635E-2D71-42E7-9E6C-FBB85A15A85F}" type="datetimeFigureOut">
               <a:rPr lang="es-CO" smtClean="0"/>
-              <a:t>5/02/2025</a:t>
+              <a:t>6/02/2025</a:t>
             </a:fld>
             <a:endParaRPr lang="es-CO"/>
           </a:p>
@@ -6114,7 +5794,7 @@
           <a:p>
             <a:fld id="{9CF7635E-2D71-42E7-9E6C-FBB85A15A85F}" type="datetimeFigureOut">
               <a:rPr lang="es-CO" smtClean="0"/>
-              <a:t>5/02/2025</a:t>
+              <a:t>6/02/2025</a:t>
             </a:fld>
             <a:endParaRPr lang="es-CO"/>
           </a:p>
@@ -6262,7 +5942,7 @@
           <a:p>
             <a:fld id="{9CF7635E-2D71-42E7-9E6C-FBB85A15A85F}" type="datetimeFigureOut">
               <a:rPr lang="es-CO" smtClean="0"/>
-              <a:t>5/02/2025</a:t>
+              <a:t>6/02/2025</a:t>
             </a:fld>
             <a:endParaRPr lang="es-CO"/>
           </a:p>
@@ -6381,7 +6061,7 @@
           <a:p>
             <a:fld id="{9CF7635E-2D71-42E7-9E6C-FBB85A15A85F}" type="datetimeFigureOut">
               <a:rPr lang="es-CO" smtClean="0"/>
-              <a:t>5/02/2025</a:t>
+              <a:t>6/02/2025</a:t>
             </a:fld>
             <a:endParaRPr lang="es-CO"/>
           </a:p>
@@ -6700,7 +6380,7 @@
           <a:p>
             <a:fld id="{9CF7635E-2D71-42E7-9E6C-FBB85A15A85F}" type="datetimeFigureOut">
               <a:rPr lang="es-CO" smtClean="0"/>
-              <a:t>5/02/2025</a:t>
+              <a:t>6/02/2025</a:t>
             </a:fld>
             <a:endParaRPr lang="es-CO"/>
           </a:p>
@@ -6995,7 +6675,7 @@
           <a:p>
             <a:fld id="{9CF7635E-2D71-42E7-9E6C-FBB85A15A85F}" type="datetimeFigureOut">
               <a:rPr lang="es-CO" smtClean="0"/>
-              <a:t>5/02/2025</a:t>
+              <a:t>6/02/2025</a:t>
             </a:fld>
             <a:endParaRPr lang="es-CO"/>
           </a:p>
@@ -7244,7 +6924,7 @@
           <a:p>
             <a:fld id="{9CF7635E-2D71-42E7-9E6C-FBB85A15A85F}" type="datetimeFigureOut">
               <a:rPr lang="es-CO" smtClean="0"/>
-              <a:t>5/02/2025</a:t>
+              <a:t>6/02/2025</a:t>
             </a:fld>
             <a:endParaRPr lang="es-CO"/>
           </a:p>
@@ -15575,6 +15255,14 @@
             <a:r>
               <a:rPr lang="en-US" sz="2000" b="1" dirty="0" err="1"/>
               <a:t>entregar</a:t>
+            </a:r>
+            <a:r>
+              <a:rPr lang="en-US" sz="2000" b="1" dirty="0"/>
+              <a:t> </a:t>
+            </a:r>
+            <a:r>
+              <a:rPr lang="en-US" sz="2000" b="1" dirty="0" err="1"/>
+              <a:t>previamente</a:t>
             </a:r>
             <a:r>
               <a:rPr lang="en-US" sz="2000" b="1" dirty="0"/>
@@ -17137,6 +16825,23 @@
 </file>
 
 <file path=customXml/item1.xml><?xml version="1.0" encoding="utf-8"?>
+<?mso-contentType ?>
+<FormTemplates xmlns="http://schemas.microsoft.com/sharepoint/v3/contenttype/forms">
+  <Display>DocumentLibraryForm</Display>
+  <Edit>DocumentLibraryForm</Edit>
+  <New>DocumentLibraryForm</New>
+</FormTemplates>
+</file>
+
+<file path=customXml/item2.xml><?xml version="1.0" encoding="utf-8"?>
+<p:properties xmlns:p="http://schemas.microsoft.com/office/2006/metadata/properties" xmlns:xsi="http://www.w3.org/2001/XMLSchema-instance" xmlns:pc="http://schemas.microsoft.com/office/infopath/2007/PartnerControls">
+  <documentManagement>
+    <_activity xmlns="bdc56f61-abc0-4f7e-bfec-a93ccd1ae886" xsi:nil="true"/>
+  </documentManagement>
+</p:properties>
+</file>
+
+<file path=customXml/item3.xml><?xml version="1.0" encoding="utf-8"?>
 <ct:contentTypeSchema xmlns:ct="http://schemas.microsoft.com/office/2006/metadata/contentType" xmlns:ma="http://schemas.microsoft.com/office/2006/metadata/properties/metaAttributes" ct:_="" ma:_="" ma:contentTypeName="Documento" ma:contentTypeID="0x0101007A62137D465CE64A8C883A4664514BF8" ma:contentTypeVersion="15" ma:contentTypeDescription="Crear nuevo documento." ma:contentTypeScope="" ma:versionID="a1bd1d59f691eb9bca6952b111268275">
   <xsd:schema xmlns:xsd="http://www.w3.org/2001/XMLSchema" xmlns:xs="http://www.w3.org/2001/XMLSchema" xmlns:p="http://schemas.microsoft.com/office/2006/metadata/properties" xmlns:ns3="669280c1-d17e-4d1d-bd7f-b4f14cc6bf1d" xmlns:ns4="bdc56f61-abc0-4f7e-bfec-a93ccd1ae886" targetNamespace="http://schemas.microsoft.com/office/2006/metadata/properties" ma:root="true" ma:fieldsID="d02990a02f19f0f9fc7b999b1809cae4" ns3:_="" ns4:_="">
     <xsd:import namespace="669280c1-d17e-4d1d-bd7f-b4f14cc6bf1d"/>
@@ -17371,38 +17076,10 @@
 </ct:contentTypeSchema>
 </file>
 
-<file path=customXml/item2.xml><?xml version="1.0" encoding="utf-8"?>
-<p:properties xmlns:p="http://schemas.microsoft.com/office/2006/metadata/properties" xmlns:xsi="http://www.w3.org/2001/XMLSchema-instance" xmlns:pc="http://schemas.microsoft.com/office/infopath/2007/PartnerControls">
-  <documentManagement>
-    <_activity xmlns="bdc56f61-abc0-4f7e-bfec-a93ccd1ae886" xsi:nil="true"/>
-  </documentManagement>
-</p:properties>
-</file>
-
-<file path=customXml/item3.xml><?xml version="1.0" encoding="utf-8"?>
-<?mso-contentType ?>
-<FormTemplates xmlns="http://schemas.microsoft.com/sharepoint/v3/contenttype/forms">
-  <Display>DocumentLibraryForm</Display>
-  <Edit>DocumentLibraryForm</Edit>
-  <New>DocumentLibraryForm</New>
-</FormTemplates>
-</file>
-
 <file path=customXml/itemProps1.xml><?xml version="1.0" encoding="utf-8"?>
-<ds:datastoreItem xmlns:ds="http://schemas.openxmlformats.org/officeDocument/2006/customXml" ds:itemID="{025820C3-FD82-4EFC-BF14-EAF1F9613F52}">
+<ds:datastoreItem xmlns:ds="http://schemas.openxmlformats.org/officeDocument/2006/customXml" ds:itemID="{4E8623C8-32E1-48B0-9F0A-13F2E9582B7E}">
   <ds:schemaRefs>
-    <ds:schemaRef ds:uri="http://schemas.microsoft.com/office/2006/metadata/contentType"/>
-    <ds:schemaRef ds:uri="http://schemas.microsoft.com/office/2006/metadata/properties/metaAttributes"/>
-    <ds:schemaRef ds:uri="http://www.w3.org/2001/XMLSchema"/>
-    <ds:schemaRef ds:uri="http://schemas.microsoft.com/office/2006/metadata/properties"/>
-    <ds:schemaRef ds:uri="669280c1-d17e-4d1d-bd7f-b4f14cc6bf1d"/>
-    <ds:schemaRef ds:uri="bdc56f61-abc0-4f7e-bfec-a93ccd1ae886"/>
-    <ds:schemaRef ds:uri="http://schemas.microsoft.com/office/2006/documentManagement/types"/>
-    <ds:schemaRef ds:uri="http://schemas.microsoft.com/office/infopath/2007/PartnerControls"/>
-    <ds:schemaRef ds:uri="http://schemas.openxmlformats.org/package/2006/metadata/core-properties"/>
-    <ds:schemaRef ds:uri="http://purl.org/dc/elements/1.1/"/>
-    <ds:schemaRef ds:uri="http://purl.org/dc/terms/"/>
-    <ds:schemaRef ds:uri="http://schemas.microsoft.com/internal/obd"/>
+    <ds:schemaRef ds:uri="http://schemas.microsoft.com/sharepoint/v3/contenttype/forms"/>
   </ds:schemaRefs>
 </ds:datastoreItem>
 </file>
@@ -17425,9 +17102,20 @@
 </file>
 
 <file path=customXml/itemProps3.xml><?xml version="1.0" encoding="utf-8"?>
-<ds:datastoreItem xmlns:ds="http://schemas.openxmlformats.org/officeDocument/2006/customXml" ds:itemID="{4E8623C8-32E1-48B0-9F0A-13F2E9582B7E}">
+<ds:datastoreItem xmlns:ds="http://schemas.openxmlformats.org/officeDocument/2006/customXml" ds:itemID="{025820C3-FD82-4EFC-BF14-EAF1F9613F52}">
   <ds:schemaRefs>
-    <ds:schemaRef ds:uri="http://schemas.microsoft.com/sharepoint/v3/contenttype/forms"/>
+    <ds:schemaRef ds:uri="http://schemas.microsoft.com/office/2006/metadata/contentType"/>
+    <ds:schemaRef ds:uri="http://schemas.microsoft.com/office/2006/metadata/properties/metaAttributes"/>
+    <ds:schemaRef ds:uri="http://www.w3.org/2001/XMLSchema"/>
+    <ds:schemaRef ds:uri="http://schemas.microsoft.com/office/2006/metadata/properties"/>
+    <ds:schemaRef ds:uri="669280c1-d17e-4d1d-bd7f-b4f14cc6bf1d"/>
+    <ds:schemaRef ds:uri="bdc56f61-abc0-4f7e-bfec-a93ccd1ae886"/>
+    <ds:schemaRef ds:uri="http://schemas.microsoft.com/office/2006/documentManagement/types"/>
+    <ds:schemaRef ds:uri="http://schemas.microsoft.com/office/infopath/2007/PartnerControls"/>
+    <ds:schemaRef ds:uri="http://schemas.openxmlformats.org/package/2006/metadata/core-properties"/>
+    <ds:schemaRef ds:uri="http://purl.org/dc/elements/1.1/"/>
+    <ds:schemaRef ds:uri="http://purl.org/dc/terms/"/>
+    <ds:schemaRef ds:uri="http://schemas.microsoft.com/internal/obd"/>
   </ds:schemaRefs>
 </ds:datastoreItem>
 </file>
</xml_diff>

<commit_message>
se actualiza la semana 3 y se crea la semana 4, hace falta generar los codigos de PSOC para timer, contadores, pwm y rtc
</commit_message>
<xml_diff>
--- a/Sesion_2/Sesion_2.pptx
+++ b/Sesion_2/Sesion_2.pptx
@@ -167,8 +167,7 @@
 <file path=ppt/revisionInfo.xml><?xml version="1.0" encoding="utf-8"?>
 <p1510:revInfo xmlns:a="http://schemas.openxmlformats.org/drawingml/2006/main" xmlns:r="http://schemas.openxmlformats.org/officeDocument/2006/relationships" xmlns:p1510="http://schemas.microsoft.com/office/powerpoint/2015/10/main">
   <p1510:revLst>
-    <p1510:client id="{8E0334EF-AE22-44E3-B339-74E453B32869}" v="64" dt="2025-02-05T20:16:32.152"/>
-    <p1510:client id="{EA65CCE7-4D40-401A-9838-3B0831D62C6E}" v="6" dt="2025-02-05T17:57:43.295"/>
+    <p1510:client id="{8E0334EF-AE22-44E3-B339-74E453B32869}" v="66" dt="2025-02-10T20:59:03.939"/>
   </p1510:revLst>
 </p1510:revInfo>
 </file>
@@ -225,14 +224,6 @@
           <pc:docMk/>
           <pc:sldMk cId="2965408220" sldId="280"/>
         </pc:sldMkLst>
-        <pc:graphicFrameChg chg="mod">
-          <ac:chgData name="JHEYSON FABIAN VILLAVISAN BUITRAGO" userId="e5ced5c2-d787-455d-b115-4f08a699b8c8" providerId="ADAL" clId="{EA65CCE7-4D40-401A-9838-3B0831D62C6E}" dt="2025-02-05T17:53:37.689" v="329"/>
-          <ac:graphicFrameMkLst>
-            <pc:docMk/>
-            <pc:sldMk cId="2965408220" sldId="280"/>
-            <ac:graphicFrameMk id="6" creationId="{D45444DB-DE93-829B-F32A-C3FB962F868B}"/>
-          </ac:graphicFrameMkLst>
-        </pc:graphicFrameChg>
       </pc:sldChg>
       <pc:sldChg chg="del">
         <pc:chgData name="JHEYSON FABIAN VILLAVISAN BUITRAGO" userId="e5ced5c2-d787-455d-b115-4f08a699b8c8" providerId="ADAL" clId="{EA65CCE7-4D40-401A-9838-3B0831D62C6E}" dt="2025-02-05T15:22:22.226" v="89" actId="47"/>
@@ -313,22 +304,6 @@
           <pc:docMk/>
           <pc:sldMk cId="2419723712" sldId="288"/>
         </pc:sldMkLst>
-        <pc:spChg chg="mod">
-          <ac:chgData name="JHEYSON FABIAN VILLAVISAN BUITRAGO" userId="e5ced5c2-d787-455d-b115-4f08a699b8c8" providerId="ADAL" clId="{EA65CCE7-4D40-401A-9838-3B0831D62C6E}" dt="2025-02-05T18:07:23.211" v="803" actId="20577"/>
-          <ac:spMkLst>
-            <pc:docMk/>
-            <pc:sldMk cId="2419723712" sldId="288"/>
-            <ac:spMk id="4" creationId="{8CB2B69D-7CD1-8E0B-CBBD-773BC09DA1FE}"/>
-          </ac:spMkLst>
-        </pc:spChg>
-        <pc:spChg chg="mod">
-          <ac:chgData name="JHEYSON FABIAN VILLAVISAN BUITRAGO" userId="e5ced5c2-d787-455d-b115-4f08a699b8c8" providerId="ADAL" clId="{EA65CCE7-4D40-401A-9838-3B0831D62C6E}" dt="2025-02-05T18:04:54.853" v="675" actId="20577"/>
-          <ac:spMkLst>
-            <pc:docMk/>
-            <pc:sldMk cId="2419723712" sldId="288"/>
-            <ac:spMk id="10" creationId="{1B67BFDA-4C46-9F73-2D4A-7479C0A18CD9}"/>
-          </ac:spMkLst>
-        </pc:spChg>
       </pc:sldChg>
     </pc:docChg>
   </pc:docChgLst>
@@ -504,12 +479,27 @@
   <pc:docChgLst>
     <pc:chgData name="JHEYSON FABIAN VILLAVISAN BUITRAGO" userId="e5ced5c2-d787-455d-b115-4f08a699b8c8" providerId="ADAL" clId="{8E0334EF-AE22-44E3-B339-74E453B32869}"/>
     <pc:docChg chg="undo custSel addSld delSld modSld modSection">
-      <pc:chgData name="JHEYSON FABIAN VILLAVISAN BUITRAGO" userId="e5ced5c2-d787-455d-b115-4f08a699b8c8" providerId="ADAL" clId="{8E0334EF-AE22-44E3-B339-74E453B32869}" dt="2025-02-06T12:38:38.659" v="1548" actId="20577"/>
+      <pc:chgData name="JHEYSON FABIAN VILLAVISAN BUITRAGO" userId="e5ced5c2-d787-455d-b115-4f08a699b8c8" providerId="ADAL" clId="{8E0334EF-AE22-44E3-B339-74E453B32869}" dt="2025-02-10T21:00:06.231" v="1654" actId="20577"/>
       <pc:docMkLst>
         <pc:docMk/>
       </pc:docMkLst>
+      <pc:sldChg chg="modSp mod">
+        <pc:chgData name="JHEYSON FABIAN VILLAVISAN BUITRAGO" userId="e5ced5c2-d787-455d-b115-4f08a699b8c8" providerId="ADAL" clId="{8E0334EF-AE22-44E3-B339-74E453B32869}" dt="2025-02-10T21:00:06.231" v="1654" actId="20577"/>
+        <pc:sldMkLst>
+          <pc:docMk/>
+          <pc:sldMk cId="3709177429" sldId="274"/>
+        </pc:sldMkLst>
+        <pc:spChg chg="mod">
+          <ac:chgData name="JHEYSON FABIAN VILLAVISAN BUITRAGO" userId="e5ced5c2-d787-455d-b115-4f08a699b8c8" providerId="ADAL" clId="{8E0334EF-AE22-44E3-B339-74E453B32869}" dt="2025-02-10T21:00:06.231" v="1654" actId="20577"/>
+          <ac:spMkLst>
+            <pc:docMk/>
+            <pc:sldMk cId="3709177429" sldId="274"/>
+            <ac:spMk id="4" creationId="{2C7E43D4-8286-4BEE-907B-3A35AE701C90}"/>
+          </ac:spMkLst>
+        </pc:spChg>
+      </pc:sldChg>
       <pc:sldChg chg="addSp delSp modSp mod">
-        <pc:chgData name="JHEYSON FABIAN VILLAVISAN BUITRAGO" userId="e5ced5c2-d787-455d-b115-4f08a699b8c8" providerId="ADAL" clId="{8E0334EF-AE22-44E3-B339-74E453B32869}" dt="2025-02-05T19:40:29.862" v="591" actId="1076"/>
+        <pc:chgData name="JHEYSON FABIAN VILLAVISAN BUITRAGO" userId="e5ced5c2-d787-455d-b115-4f08a699b8c8" providerId="ADAL" clId="{8E0334EF-AE22-44E3-B339-74E453B32869}" dt="2025-02-10T20:59:03.938" v="1604" actId="1076"/>
         <pc:sldMkLst>
           <pc:docMk/>
           <pc:sldMk cId="4035662027" sldId="286"/>
@@ -522,16 +512,8 @@
             <ac:spMk id="4" creationId="{8A0CF200-2A59-F009-B9B5-2579EA98BD8F}"/>
           </ac:spMkLst>
         </pc:spChg>
-        <pc:picChg chg="add del">
-          <ac:chgData name="JHEYSON FABIAN VILLAVISAN BUITRAGO" userId="e5ced5c2-d787-455d-b115-4f08a699b8c8" providerId="ADAL" clId="{8E0334EF-AE22-44E3-B339-74E453B32869}" dt="2025-02-05T19:40:15.061" v="587" actId="478"/>
-          <ac:picMkLst>
-            <pc:docMk/>
-            <pc:sldMk cId="4035662027" sldId="286"/>
-            <ac:picMk id="1026" creationId="{AD60B55A-260C-CA2B-EEB6-D49DDFB57CA5}"/>
-          </ac:picMkLst>
-        </pc:picChg>
         <pc:picChg chg="add mod">
-          <ac:chgData name="JHEYSON FABIAN VILLAVISAN BUITRAGO" userId="e5ced5c2-d787-455d-b115-4f08a699b8c8" providerId="ADAL" clId="{8E0334EF-AE22-44E3-B339-74E453B32869}" dt="2025-02-05T19:40:29.862" v="591" actId="1076"/>
+          <ac:chgData name="JHEYSON FABIAN VILLAVISAN BUITRAGO" userId="e5ced5c2-d787-455d-b115-4f08a699b8c8" providerId="ADAL" clId="{8E0334EF-AE22-44E3-B339-74E453B32869}" dt="2025-02-10T20:59:03.938" v="1604" actId="1076"/>
           <ac:picMkLst>
             <pc:docMk/>
             <pc:sldMk cId="4035662027" sldId="286"/>
@@ -540,13 +522,13 @@
         </pc:picChg>
       </pc:sldChg>
       <pc:sldChg chg="addSp modSp add mod">
-        <pc:chgData name="JHEYSON FABIAN VILLAVISAN BUITRAGO" userId="e5ced5c2-d787-455d-b115-4f08a699b8c8" providerId="ADAL" clId="{8E0334EF-AE22-44E3-B339-74E453B32869}" dt="2025-02-05T19:57:48.543" v="780" actId="1038"/>
+        <pc:chgData name="JHEYSON FABIAN VILLAVISAN BUITRAGO" userId="e5ced5c2-d787-455d-b115-4f08a699b8c8" providerId="ADAL" clId="{8E0334EF-AE22-44E3-B339-74E453B32869}" dt="2025-02-10T20:40:13.783" v="1580" actId="20577"/>
         <pc:sldMkLst>
           <pc:docMk/>
           <pc:sldMk cId="1966865413" sldId="288"/>
         </pc:sldMkLst>
         <pc:spChg chg="mod">
-          <ac:chgData name="JHEYSON FABIAN VILLAVISAN BUITRAGO" userId="e5ced5c2-d787-455d-b115-4f08a699b8c8" providerId="ADAL" clId="{8E0334EF-AE22-44E3-B339-74E453B32869}" dt="2025-02-05T19:52:23.913" v="706" actId="20577"/>
+          <ac:chgData name="JHEYSON FABIAN VILLAVISAN BUITRAGO" userId="e5ced5c2-d787-455d-b115-4f08a699b8c8" providerId="ADAL" clId="{8E0334EF-AE22-44E3-B339-74E453B32869}" dt="2025-02-10T20:40:13.783" v="1580" actId="20577"/>
           <ac:spMkLst>
             <pc:docMk/>
             <pc:sldMk cId="1966865413" sldId="288"/>
@@ -570,14 +552,6 @@
           </ac:graphicFrameMkLst>
         </pc:graphicFrameChg>
         <pc:picChg chg="add mod">
-          <ac:chgData name="JHEYSON FABIAN VILLAVISAN BUITRAGO" userId="e5ced5c2-d787-455d-b115-4f08a699b8c8" providerId="ADAL" clId="{8E0334EF-AE22-44E3-B339-74E453B32869}" dt="2025-02-05T19:43:04.527" v="608" actId="14100"/>
-          <ac:picMkLst>
-            <pc:docMk/>
-            <pc:sldMk cId="1966865413" sldId="288"/>
-            <ac:picMk id="2050" creationId="{AC159CE4-BA0E-E508-7430-FC875357EE43}"/>
-          </ac:picMkLst>
-        </pc:picChg>
-        <pc:picChg chg="add mod">
           <ac:chgData name="JHEYSON FABIAN VILLAVISAN BUITRAGO" userId="e5ced5c2-d787-455d-b115-4f08a699b8c8" providerId="ADAL" clId="{8E0334EF-AE22-44E3-B339-74E453B32869}" dt="2025-02-05T19:57:48.543" v="780" actId="1038"/>
           <ac:picMkLst>
             <pc:docMk/>
@@ -592,14 +566,6 @@
           <pc:docMk/>
           <pc:sldMk cId="2419723712" sldId="288"/>
         </pc:sldMkLst>
-        <pc:spChg chg="mod">
-          <ac:chgData name="JHEYSON FABIAN VILLAVISAN BUITRAGO" userId="e5ced5c2-d787-455d-b115-4f08a699b8c8" providerId="ADAL" clId="{8E0334EF-AE22-44E3-B339-74E453B32869}" dt="2025-02-05T18:18:05.592" v="137" actId="20577"/>
-          <ac:spMkLst>
-            <pc:docMk/>
-            <pc:sldMk cId="2419723712" sldId="288"/>
-            <ac:spMk id="4" creationId="{8CB2B69D-7CD1-8E0B-CBBD-773BC09DA1FE}"/>
-          </ac:spMkLst>
-        </pc:spChg>
       </pc:sldChg>
       <pc:sldChg chg="addSp modSp add mod">
         <pc:chgData name="JHEYSON FABIAN VILLAVISAN BUITRAGO" userId="e5ced5c2-d787-455d-b115-4f08a699b8c8" providerId="ADAL" clId="{8E0334EF-AE22-44E3-B339-74E453B32869}" dt="2025-02-05T19:52:48.369" v="718" actId="20577"/>
@@ -646,28 +612,12 @@
             <ac:spMk id="2" creationId="{4790CA2C-439C-CC14-B12B-6F09802510AE}"/>
           </ac:spMkLst>
         </pc:spChg>
-        <pc:spChg chg="add">
-          <ac:chgData name="JHEYSON FABIAN VILLAVISAN BUITRAGO" userId="e5ced5c2-d787-455d-b115-4f08a699b8c8" providerId="ADAL" clId="{8E0334EF-AE22-44E3-B339-74E453B32869}" dt="2025-02-05T19:55:43.729" v="719"/>
-          <ac:spMkLst>
-            <pc:docMk/>
-            <pc:sldMk cId="2953627009" sldId="290"/>
-            <ac:spMk id="3" creationId="{4C63FAB2-3F8F-8C97-8C1C-9BC172C23CB8}"/>
-          </ac:spMkLst>
-        </pc:spChg>
         <pc:spChg chg="mod">
           <ac:chgData name="JHEYSON FABIAN VILLAVISAN BUITRAGO" userId="e5ced5c2-d787-455d-b115-4f08a699b8c8" providerId="ADAL" clId="{8E0334EF-AE22-44E3-B339-74E453B32869}" dt="2025-02-06T12:38:38.659" v="1548" actId="20577"/>
           <ac:spMkLst>
             <pc:docMk/>
             <pc:sldMk cId="2953627009" sldId="290"/>
             <ac:spMk id="4" creationId="{BDACA907-708B-9C1A-BE87-DD07899D7BE0}"/>
-          </ac:spMkLst>
-        </pc:spChg>
-        <pc:spChg chg="add">
-          <ac:chgData name="JHEYSON FABIAN VILLAVISAN BUITRAGO" userId="e5ced5c2-d787-455d-b115-4f08a699b8c8" providerId="ADAL" clId="{8E0334EF-AE22-44E3-B339-74E453B32869}" dt="2025-02-05T19:55:47.683" v="720"/>
-          <ac:spMkLst>
-            <pc:docMk/>
-            <pc:sldMk cId="2953627009" sldId="290"/>
-            <ac:spMk id="6" creationId="{EE20C3D2-15E8-A50D-A129-BBD9A18003D5}"/>
           </ac:spMkLst>
         </pc:spChg>
         <pc:spChg chg="mod">
@@ -1222,7 +1172,7 @@
               <a:pPr>
                 <a:defRPr/>
               </a:pPr>
-              <a:t>6/02/2025</a:t>
+              <a:t>10/02/2025</a:t>
             </a:fld>
             <a:endParaRPr lang="es-CO"/>
           </a:p>
@@ -1465,7 +1415,7 @@
               <a:pPr>
                 <a:defRPr/>
               </a:pPr>
-              <a:t>6/02/2025</a:t>
+              <a:t>10/02/2025</a:t>
             </a:fld>
             <a:endParaRPr lang="es-CO"/>
           </a:p>
@@ -2541,7 +2491,7 @@
           <a:p>
             <a:fld id="{9CF7635E-2D71-42E7-9E6C-FBB85A15A85F}" type="datetimeFigureOut">
               <a:rPr lang="es-CO" smtClean="0"/>
-              <a:t>6/02/2025</a:t>
+              <a:t>10/02/2025</a:t>
             </a:fld>
             <a:endParaRPr lang="es-CO"/>
           </a:p>
@@ -2807,7 +2757,7 @@
           <a:p>
             <a:fld id="{9CF7635E-2D71-42E7-9E6C-FBB85A15A85F}" type="datetimeFigureOut">
               <a:rPr lang="es-CO" smtClean="0"/>
-              <a:t>6/02/2025</a:t>
+              <a:t>10/02/2025</a:t>
             </a:fld>
             <a:endParaRPr lang="es-CO"/>
           </a:p>
@@ -3023,7 +2973,7 @@
           <a:p>
             <a:fld id="{9CF7635E-2D71-42E7-9E6C-FBB85A15A85F}" type="datetimeFigureOut">
               <a:rPr lang="es-CO" smtClean="0"/>
-              <a:t>6/02/2025</a:t>
+              <a:t>10/02/2025</a:t>
             </a:fld>
             <a:endParaRPr lang="es-CO"/>
           </a:p>
@@ -4652,7 +4602,7 @@
           <a:p>
             <a:fld id="{9CF7635E-2D71-42E7-9E6C-FBB85A15A85F}" type="datetimeFigureOut">
               <a:rPr lang="es-CO" smtClean="0"/>
-              <a:t>6/02/2025</a:t>
+              <a:t>10/02/2025</a:t>
             </a:fld>
             <a:endParaRPr lang="es-CO"/>
           </a:p>
@@ -5099,7 +5049,7 @@
           <a:p>
             <a:fld id="{9CF7635E-2D71-42E7-9E6C-FBB85A15A85F}" type="datetimeFigureOut">
               <a:rPr lang="es-CO" smtClean="0"/>
-              <a:t>6/02/2025</a:t>
+              <a:t>10/02/2025</a:t>
             </a:fld>
             <a:endParaRPr lang="es-CO"/>
           </a:p>
@@ -5373,7 +5323,7 @@
           <a:p>
             <a:fld id="{9CF7635E-2D71-42E7-9E6C-FBB85A15A85F}" type="datetimeFigureOut">
               <a:rPr lang="es-CO" smtClean="0"/>
-              <a:t>6/02/2025</a:t>
+              <a:t>10/02/2025</a:t>
             </a:fld>
             <a:endParaRPr lang="es-CO"/>
           </a:p>
@@ -5794,7 +5744,7 @@
           <a:p>
             <a:fld id="{9CF7635E-2D71-42E7-9E6C-FBB85A15A85F}" type="datetimeFigureOut">
               <a:rPr lang="es-CO" smtClean="0"/>
-              <a:t>6/02/2025</a:t>
+              <a:t>10/02/2025</a:t>
             </a:fld>
             <a:endParaRPr lang="es-CO"/>
           </a:p>
@@ -5942,7 +5892,7 @@
           <a:p>
             <a:fld id="{9CF7635E-2D71-42E7-9E6C-FBB85A15A85F}" type="datetimeFigureOut">
               <a:rPr lang="es-CO" smtClean="0"/>
-              <a:t>6/02/2025</a:t>
+              <a:t>10/02/2025</a:t>
             </a:fld>
             <a:endParaRPr lang="es-CO"/>
           </a:p>
@@ -6061,7 +6011,7 @@
           <a:p>
             <a:fld id="{9CF7635E-2D71-42E7-9E6C-FBB85A15A85F}" type="datetimeFigureOut">
               <a:rPr lang="es-CO" smtClean="0"/>
-              <a:t>6/02/2025</a:t>
+              <a:t>10/02/2025</a:t>
             </a:fld>
             <a:endParaRPr lang="es-CO"/>
           </a:p>
@@ -6380,7 +6330,7 @@
           <a:p>
             <a:fld id="{9CF7635E-2D71-42E7-9E6C-FBB85A15A85F}" type="datetimeFigureOut">
               <a:rPr lang="es-CO" smtClean="0"/>
-              <a:t>6/02/2025</a:t>
+              <a:t>10/02/2025</a:t>
             </a:fld>
             <a:endParaRPr lang="es-CO"/>
           </a:p>
@@ -6675,7 +6625,7 @@
           <a:p>
             <a:fld id="{9CF7635E-2D71-42E7-9E6C-FBB85A15A85F}" type="datetimeFigureOut">
               <a:rPr lang="es-CO" smtClean="0"/>
-              <a:t>6/02/2025</a:t>
+              <a:t>10/02/2025</a:t>
             </a:fld>
             <a:endParaRPr lang="es-CO"/>
           </a:p>
@@ -6924,7 +6874,7 @@
           <a:p>
             <a:fld id="{9CF7635E-2D71-42E7-9E6C-FBB85A15A85F}" type="datetimeFigureOut">
               <a:rPr lang="es-CO" smtClean="0"/>
-              <a:t>6/02/2025</a:t>
+              <a:t>10/02/2025</a:t>
             </a:fld>
             <a:endParaRPr lang="es-CO"/>
           </a:p>
@@ -12250,15 +12200,7 @@
             <a:pPr algn="just"/>
             <a:r>
               <a:rPr lang="es-CO" sz="2400" dirty="0"/>
-              <a:t>Familiarizar a los estudiantes con el lenguaje de programación </a:t>
-            </a:r>
-            <a:r>
-              <a:rPr lang="es-CO" sz="2400" b="1" dirty="0"/>
-              <a:t>C</a:t>
-            </a:r>
-            <a:r>
-              <a:rPr lang="es-CO" sz="2400" dirty="0"/>
-              <a:t>.</a:t>
+              <a:t>Familiarizar a los estudiantes con los periféricos de entrada y salida digital en los microcontroladores.</a:t>
             </a:r>
           </a:p>
         </p:txBody>
@@ -13410,7 +13352,7 @@
         </p:blipFill>
         <p:spPr bwMode="auto">
           <a:xfrm>
-            <a:off x="3131840" y="3650393"/>
+            <a:off x="3131840" y="3634587"/>
             <a:ext cx="3240360" cy="2396128"/>
           </a:xfrm>
           <a:prstGeom prst="rect">
@@ -13545,7 +13487,7 @@
               <a:rPr lang="es-CO" sz="2000" b="1" noProof="0" dirty="0">
                 <a:latin typeface="+mj-lt"/>
               </a:rPr>
-              <a:t>Usando </a:t>
+              <a:t>Usando  (Repaso Mapas de Karnaugh)</a:t>
             </a:r>
           </a:p>
           <a:p>
@@ -16825,15 +16767,6 @@
 </file>
 
 <file path=customXml/item1.xml><?xml version="1.0" encoding="utf-8"?>
-<?mso-contentType ?>
-<FormTemplates xmlns="http://schemas.microsoft.com/sharepoint/v3/contenttype/forms">
-  <Display>DocumentLibraryForm</Display>
-  <Edit>DocumentLibraryForm</Edit>
-  <New>DocumentLibraryForm</New>
-</FormTemplates>
-</file>
-
-<file path=customXml/item2.xml><?xml version="1.0" encoding="utf-8"?>
 <p:properties xmlns:p="http://schemas.microsoft.com/office/2006/metadata/properties" xmlns:xsi="http://www.w3.org/2001/XMLSchema-instance" xmlns:pc="http://schemas.microsoft.com/office/infopath/2007/PartnerControls">
   <documentManagement>
     <_activity xmlns="bdc56f61-abc0-4f7e-bfec-a93ccd1ae886" xsi:nil="true"/>
@@ -16841,7 +16774,7 @@
 </p:properties>
 </file>
 
-<file path=customXml/item3.xml><?xml version="1.0" encoding="utf-8"?>
+<file path=customXml/item2.xml><?xml version="1.0" encoding="utf-8"?>
 <ct:contentTypeSchema xmlns:ct="http://schemas.microsoft.com/office/2006/metadata/contentType" xmlns:ma="http://schemas.microsoft.com/office/2006/metadata/properties/metaAttributes" ct:_="" ma:_="" ma:contentTypeName="Documento" ma:contentTypeID="0x0101007A62137D465CE64A8C883A4664514BF8" ma:contentTypeVersion="15" ma:contentTypeDescription="Crear nuevo documento." ma:contentTypeScope="" ma:versionID="a1bd1d59f691eb9bca6952b111268275">
   <xsd:schema xmlns:xsd="http://www.w3.org/2001/XMLSchema" xmlns:xs="http://www.w3.org/2001/XMLSchema" xmlns:p="http://schemas.microsoft.com/office/2006/metadata/properties" xmlns:ns3="669280c1-d17e-4d1d-bd7f-b4f14cc6bf1d" xmlns:ns4="bdc56f61-abc0-4f7e-bfec-a93ccd1ae886" targetNamespace="http://schemas.microsoft.com/office/2006/metadata/properties" ma:root="true" ma:fieldsID="d02990a02f19f0f9fc7b999b1809cae4" ns3:_="" ns4:_="">
     <xsd:import namespace="669280c1-d17e-4d1d-bd7f-b4f14cc6bf1d"/>
@@ -17076,15 +17009,16 @@
 </ct:contentTypeSchema>
 </file>
 
-<file path=customXml/itemProps1.xml><?xml version="1.0" encoding="utf-8"?>
-<ds:datastoreItem xmlns:ds="http://schemas.openxmlformats.org/officeDocument/2006/customXml" ds:itemID="{4E8623C8-32E1-48B0-9F0A-13F2E9582B7E}">
-  <ds:schemaRefs>
-    <ds:schemaRef ds:uri="http://schemas.microsoft.com/sharepoint/v3/contenttype/forms"/>
-  </ds:schemaRefs>
-</ds:datastoreItem>
+<file path=customXml/item3.xml><?xml version="1.0" encoding="utf-8"?>
+<?mso-contentType ?>
+<FormTemplates xmlns="http://schemas.microsoft.com/sharepoint/v3/contenttype/forms">
+  <Display>DocumentLibraryForm</Display>
+  <Edit>DocumentLibraryForm</Edit>
+  <New>DocumentLibraryForm</New>
+</FormTemplates>
 </file>
 
-<file path=customXml/itemProps2.xml><?xml version="1.0" encoding="utf-8"?>
+<file path=customXml/itemProps1.xml><?xml version="1.0" encoding="utf-8"?>
 <ds:datastoreItem xmlns:ds="http://schemas.openxmlformats.org/officeDocument/2006/customXml" ds:itemID="{0825853C-1B27-4995-A583-4D39F900BB7F}">
   <ds:schemaRefs>
     <ds:schemaRef ds:uri="http://schemas.microsoft.com/office/2006/documentManagement/types"/>
@@ -17101,7 +17035,7 @@
 </ds:datastoreItem>
 </file>
 
-<file path=customXml/itemProps3.xml><?xml version="1.0" encoding="utf-8"?>
+<file path=customXml/itemProps2.xml><?xml version="1.0" encoding="utf-8"?>
 <ds:datastoreItem xmlns:ds="http://schemas.openxmlformats.org/officeDocument/2006/customXml" ds:itemID="{025820C3-FD82-4EFC-BF14-EAF1F9613F52}">
   <ds:schemaRefs>
     <ds:schemaRef ds:uri="http://schemas.microsoft.com/office/2006/metadata/contentType"/>
@@ -17118,4 +17052,12 @@
     <ds:schemaRef ds:uri="http://schemas.microsoft.com/internal/obd"/>
   </ds:schemaRefs>
 </ds:datastoreItem>
+</file>
+
+<file path=customXml/itemProps3.xml><?xml version="1.0" encoding="utf-8"?>
+<ds:datastoreItem xmlns:ds="http://schemas.openxmlformats.org/officeDocument/2006/customXml" ds:itemID="{4E8623C8-32E1-48B0-9F0A-13F2E9582B7E}">
+  <ds:schemaRefs>
+    <ds:schemaRef ds:uri="http://schemas.microsoft.com/sharepoint/v3/contenttype/forms"/>
+  </ds:schemaRefs>
+</ds:datastoreItem>
 </file>
</xml_diff>